<commit_message>
Fachadministrator in Install Anleitung aufgenommen.
</commit_message>
<xml_diff>
--- a/3a. DataFactory - Installation and Update/DataFactoy Systemvoraussetzungen.pptx
+++ b/3a. DataFactory - Installation and Update/DataFactoy Systemvoraussetzungen.pptx
@@ -305,7 +305,7 @@
             <a:fld id="{4A822124-BDB8-4DC5-8F41-BBB4CF6022AF}" type="datetimeFigureOut">
               <a:rPr lang="de-DE" smtClean="0"/>
               <a:pPr/>
-              <a:t>24.10.2018</a:t>
+              <a:t>02.11.2018</a:t>
             </a:fld>
             <a:endParaRPr lang="de-DE" dirty="0"/>
           </a:p>
@@ -470,7 +470,7 @@
             <a:fld id="{4A822124-BDB8-4DC5-8F41-BBB4CF6022AF}" type="datetimeFigureOut">
               <a:rPr lang="de-DE" smtClean="0"/>
               <a:pPr/>
-              <a:t>24.10.2018</a:t>
+              <a:t>02.11.2018</a:t>
             </a:fld>
             <a:endParaRPr lang="de-DE" dirty="0"/>
           </a:p>
@@ -645,7 +645,7 @@
             <a:fld id="{4A822124-BDB8-4DC5-8F41-BBB4CF6022AF}" type="datetimeFigureOut">
               <a:rPr lang="de-DE" smtClean="0"/>
               <a:pPr/>
-              <a:t>24.10.2018</a:t>
+              <a:t>02.11.2018</a:t>
             </a:fld>
             <a:endParaRPr lang="de-DE" dirty="0"/>
           </a:p>
@@ -810,7 +810,7 @@
             <a:fld id="{4A822124-BDB8-4DC5-8F41-BBB4CF6022AF}" type="datetimeFigureOut">
               <a:rPr lang="de-DE" smtClean="0"/>
               <a:pPr/>
-              <a:t>24.10.2018</a:t>
+              <a:t>02.11.2018</a:t>
             </a:fld>
             <a:endParaRPr lang="de-DE" dirty="0"/>
           </a:p>
@@ -1052,7 +1052,7 @@
             <a:fld id="{4A822124-BDB8-4DC5-8F41-BBB4CF6022AF}" type="datetimeFigureOut">
               <a:rPr lang="de-DE" smtClean="0"/>
               <a:pPr/>
-              <a:t>24.10.2018</a:t>
+              <a:t>02.11.2018</a:t>
             </a:fld>
             <a:endParaRPr lang="de-DE" dirty="0"/>
           </a:p>
@@ -1334,7 +1334,7 @@
             <a:fld id="{4A822124-BDB8-4DC5-8F41-BBB4CF6022AF}" type="datetimeFigureOut">
               <a:rPr lang="de-DE" smtClean="0"/>
               <a:pPr/>
-              <a:t>24.10.2018</a:t>
+              <a:t>02.11.2018</a:t>
             </a:fld>
             <a:endParaRPr lang="de-DE" dirty="0"/>
           </a:p>
@@ -1755,7 +1755,7 @@
             <a:fld id="{4A822124-BDB8-4DC5-8F41-BBB4CF6022AF}" type="datetimeFigureOut">
               <a:rPr lang="de-DE" smtClean="0"/>
               <a:pPr/>
-              <a:t>24.10.2018</a:t>
+              <a:t>02.11.2018</a:t>
             </a:fld>
             <a:endParaRPr lang="de-DE" dirty="0"/>
           </a:p>
@@ -1869,7 +1869,7 @@
             <a:fld id="{4A822124-BDB8-4DC5-8F41-BBB4CF6022AF}" type="datetimeFigureOut">
               <a:rPr lang="de-DE" smtClean="0"/>
               <a:pPr/>
-              <a:t>24.10.2018</a:t>
+              <a:t>02.11.2018</a:t>
             </a:fld>
             <a:endParaRPr lang="de-DE" dirty="0"/>
           </a:p>
@@ -1961,7 +1961,7 @@
             <a:fld id="{4A822124-BDB8-4DC5-8F41-BBB4CF6022AF}" type="datetimeFigureOut">
               <a:rPr lang="de-DE" smtClean="0"/>
               <a:pPr/>
-              <a:t>24.10.2018</a:t>
+              <a:t>02.11.2018</a:t>
             </a:fld>
             <a:endParaRPr lang="de-DE" dirty="0"/>
           </a:p>
@@ -2233,7 +2233,7 @@
             <a:fld id="{4A822124-BDB8-4DC5-8F41-BBB4CF6022AF}" type="datetimeFigureOut">
               <a:rPr lang="de-DE" smtClean="0"/>
               <a:pPr/>
-              <a:t>24.10.2018</a:t>
+              <a:t>02.11.2018</a:t>
             </a:fld>
             <a:endParaRPr lang="de-DE" dirty="0"/>
           </a:p>
@@ -2482,7 +2482,7 @@
             <a:fld id="{4A822124-BDB8-4DC5-8F41-BBB4CF6022AF}" type="datetimeFigureOut">
               <a:rPr lang="de-DE" smtClean="0"/>
               <a:pPr/>
-              <a:t>24.10.2018</a:t>
+              <a:t>02.11.2018</a:t>
             </a:fld>
             <a:endParaRPr lang="de-DE" dirty="0"/>
           </a:p>
@@ -2690,7 +2690,7 @@
             <a:fld id="{4A822124-BDB8-4DC5-8F41-BBB4CF6022AF}" type="datetimeFigureOut">
               <a:rPr lang="de-DE" smtClean="0"/>
               <a:pPr/>
-              <a:t>24.10.2018</a:t>
+              <a:t>02.11.2018</a:t>
             </a:fld>
             <a:endParaRPr lang="de-DE" dirty="0"/>
           </a:p>
@@ -3688,7 +3688,7 @@
         <p:spPr>
           <a:xfrm>
             <a:off x="244976" y="1140824"/>
-            <a:ext cx="6120680" cy="5386090"/>
+            <a:ext cx="6120680" cy="5940088"/>
           </a:xfrm>
           <a:prstGeom prst="rect">
             <a:avLst/>
@@ -4344,6 +4344,23 @@
                 </a:solidFill>
               </a:rPr>
               <a:t>ggf. lesender SQL Zugriff auf Vorsystemdatenbanken </a:t>
+            </a:r>
+          </a:p>
+          <a:p>
+            <a:pPr marL="800100" lvl="1" indent="-342900">
+              <a:buFont typeface="Arial" pitchFamily="34" charset="0"/>
+              <a:buChar char="•"/>
+            </a:pPr>
+            <a:r>
+              <a:rPr lang="de-DE" sz="1200" dirty="0">
+                <a:solidFill>
+                  <a:schemeClr val="tx1">
+                    <a:lumMod val="85000"/>
+                    <a:lumOff val="15000"/>
+                  </a:schemeClr>
+                </a:solidFill>
+              </a:rPr>
+              <a:t>Bitte nennen Sie uns vor der Installation Domäne\Benutzername des Fachadministrators für DataFactory. Üblicherweise ein User aus dem Controlling, welcher allen andern Benutzer interne DataFactory Rechte zuweist.</a:t>
             </a:r>
           </a:p>
           <a:p>

</xml_diff>

<commit_message>
Update Solutionkonzept und Systemvoraussetzungen
</commit_message>
<xml_diff>
--- a/3a. DataFactory - Installation and Update/DataFactoy Systemvoraussetzungen.pptx
+++ b/3a. DataFactory - Installation and Update/DataFactoy Systemvoraussetzungen.pptx
@@ -7,7 +7,8 @@
   <p:sldIdLst>
     <p:sldId id="274" r:id="rId2"/>
     <p:sldId id="273" r:id="rId3"/>
-    <p:sldId id="275" r:id="rId4"/>
+    <p:sldId id="276" r:id="rId4"/>
+    <p:sldId id="275" r:id="rId5"/>
   </p:sldIdLst>
   <p:sldSz cx="6858000" cy="9906000" type="A4"/>
   <p:notesSz cx="7099300" cy="10234613"/>
@@ -305,7 +306,7 @@
             <a:fld id="{4A822124-BDB8-4DC5-8F41-BBB4CF6022AF}" type="datetimeFigureOut">
               <a:rPr lang="de-DE" smtClean="0"/>
               <a:pPr/>
-              <a:t>03.01.2019</a:t>
+              <a:t>17.01.2019</a:t>
             </a:fld>
             <a:endParaRPr lang="de-DE" dirty="0"/>
           </a:p>
@@ -470,7 +471,7 @@
             <a:fld id="{4A822124-BDB8-4DC5-8F41-BBB4CF6022AF}" type="datetimeFigureOut">
               <a:rPr lang="de-DE" smtClean="0"/>
               <a:pPr/>
-              <a:t>03.01.2019</a:t>
+              <a:t>17.01.2019</a:t>
             </a:fld>
             <a:endParaRPr lang="de-DE" dirty="0"/>
           </a:p>
@@ -645,7 +646,7 @@
             <a:fld id="{4A822124-BDB8-4DC5-8F41-BBB4CF6022AF}" type="datetimeFigureOut">
               <a:rPr lang="de-DE" smtClean="0"/>
               <a:pPr/>
-              <a:t>03.01.2019</a:t>
+              <a:t>17.01.2019</a:t>
             </a:fld>
             <a:endParaRPr lang="de-DE" dirty="0"/>
           </a:p>
@@ -810,7 +811,7 @@
             <a:fld id="{4A822124-BDB8-4DC5-8F41-BBB4CF6022AF}" type="datetimeFigureOut">
               <a:rPr lang="de-DE" smtClean="0"/>
               <a:pPr/>
-              <a:t>03.01.2019</a:t>
+              <a:t>17.01.2019</a:t>
             </a:fld>
             <a:endParaRPr lang="de-DE" dirty="0"/>
           </a:p>
@@ -1052,7 +1053,7 @@
             <a:fld id="{4A822124-BDB8-4DC5-8F41-BBB4CF6022AF}" type="datetimeFigureOut">
               <a:rPr lang="de-DE" smtClean="0"/>
               <a:pPr/>
-              <a:t>03.01.2019</a:t>
+              <a:t>17.01.2019</a:t>
             </a:fld>
             <a:endParaRPr lang="de-DE" dirty="0"/>
           </a:p>
@@ -1334,7 +1335,7 @@
             <a:fld id="{4A822124-BDB8-4DC5-8F41-BBB4CF6022AF}" type="datetimeFigureOut">
               <a:rPr lang="de-DE" smtClean="0"/>
               <a:pPr/>
-              <a:t>03.01.2019</a:t>
+              <a:t>17.01.2019</a:t>
             </a:fld>
             <a:endParaRPr lang="de-DE" dirty="0"/>
           </a:p>
@@ -1755,7 +1756,7 @@
             <a:fld id="{4A822124-BDB8-4DC5-8F41-BBB4CF6022AF}" type="datetimeFigureOut">
               <a:rPr lang="de-DE" smtClean="0"/>
               <a:pPr/>
-              <a:t>03.01.2019</a:t>
+              <a:t>17.01.2019</a:t>
             </a:fld>
             <a:endParaRPr lang="de-DE" dirty="0"/>
           </a:p>
@@ -1869,7 +1870,7 @@
             <a:fld id="{4A822124-BDB8-4DC5-8F41-BBB4CF6022AF}" type="datetimeFigureOut">
               <a:rPr lang="de-DE" smtClean="0"/>
               <a:pPr/>
-              <a:t>03.01.2019</a:t>
+              <a:t>17.01.2019</a:t>
             </a:fld>
             <a:endParaRPr lang="de-DE" dirty="0"/>
           </a:p>
@@ -1961,7 +1962,7 @@
             <a:fld id="{4A822124-BDB8-4DC5-8F41-BBB4CF6022AF}" type="datetimeFigureOut">
               <a:rPr lang="de-DE" smtClean="0"/>
               <a:pPr/>
-              <a:t>03.01.2019</a:t>
+              <a:t>17.01.2019</a:t>
             </a:fld>
             <a:endParaRPr lang="de-DE" dirty="0"/>
           </a:p>
@@ -2233,7 +2234,7 @@
             <a:fld id="{4A822124-BDB8-4DC5-8F41-BBB4CF6022AF}" type="datetimeFigureOut">
               <a:rPr lang="de-DE" smtClean="0"/>
               <a:pPr/>
-              <a:t>03.01.2019</a:t>
+              <a:t>17.01.2019</a:t>
             </a:fld>
             <a:endParaRPr lang="de-DE" dirty="0"/>
           </a:p>
@@ -2482,7 +2483,7 @@
             <a:fld id="{4A822124-BDB8-4DC5-8F41-BBB4CF6022AF}" type="datetimeFigureOut">
               <a:rPr lang="de-DE" smtClean="0"/>
               <a:pPr/>
-              <a:t>03.01.2019</a:t>
+              <a:t>17.01.2019</a:t>
             </a:fld>
             <a:endParaRPr lang="de-DE" dirty="0"/>
           </a:p>
@@ -2690,7 +2691,7 @@
             <a:fld id="{4A822124-BDB8-4DC5-8F41-BBB4CF6022AF}" type="datetimeFigureOut">
               <a:rPr lang="de-DE" smtClean="0"/>
               <a:pPr/>
-              <a:t>03.01.2019</a:t>
+              <a:t>17.01.2019</a:t>
             </a:fld>
             <a:endParaRPr lang="de-DE" dirty="0"/>
           </a:p>
@@ -3341,7 +3342,7 @@
           <a:p>
             <a:r>
               <a:rPr lang="de-DE" sz="1200" dirty="0"/>
-              <a:t>Der Aufbau des Systems erfolgt meist über mehrere Monate, wir bitten Sie daher um einen permanenten RDP Zugriff auf den Server. Bitte sperren Sie im RDP nicht die Zwischenablage </a:t>
+              <a:t>Der Aufbau des Systems erfolgt meist über mehrere Monate, wir bitten Sie daher um einen permanenten RDP Zugriff auf den Server für den Projektzeitraum. Bitte sperren Sie im RDP nicht die Zwischenablage </a:t>
             </a:r>
             <a:r>
               <a:rPr lang="de-DE" sz="800" dirty="0"/>
@@ -4360,7 +4361,7 @@
                   </a:schemeClr>
                 </a:solidFill>
               </a:rPr>
-              <a:t>Bitte nennen Sie uns vor der Installation Domäne\Benutzername des Fachadministrators für DataFactory. Üblicherweise ein User aus dem Controlling, welcher allen andern Benutzer interne DataFactory Rechte zuweist.</a:t>
+              <a:t>Bitte nennen Sie uns vor der Installation Domäne\Benutzername des Fachadministrators für DataFactory. Üblicherweise ein User aus dem Controlling, welcher allen anderen Benutzer interne DataFactory Rechte zuweist.</a:t>
             </a:r>
           </a:p>
           <a:p>
@@ -4679,6 +4680,589 @@
 </file>
 
 <file path=ppt/slides/slide3.xml><?xml version="1.0" encoding="utf-8"?>
+<p:sld xmlns:a="http://schemas.openxmlformats.org/drawingml/2006/main" xmlns:r="http://schemas.openxmlformats.org/officeDocument/2006/relationships" xmlns:p="http://schemas.openxmlformats.org/presentationml/2006/main">
+  <p:cSld>
+    <p:spTree>
+      <p:nvGrpSpPr>
+        <p:cNvPr id="1" name=""/>
+        <p:cNvGrpSpPr/>
+        <p:nvPr/>
+      </p:nvGrpSpPr>
+      <p:grpSpPr>
+        <a:xfrm>
+          <a:off x="0" y="0"/>
+          <a:ext cx="0" cy="0"/>
+          <a:chOff x="0" y="0"/>
+          <a:chExt cx="0" cy="0"/>
+        </a:xfrm>
+      </p:grpSpPr>
+      <p:sp>
+        <p:nvSpPr>
+          <p:cNvPr id="14" name="Textfeld 13"/>
+          <p:cNvSpPr txBox="1"/>
+          <p:nvPr/>
+        </p:nvSpPr>
+        <p:spPr>
+          <a:xfrm>
+            <a:off x="244976" y="1140824"/>
+            <a:ext cx="6120680" cy="3046988"/>
+          </a:xfrm>
+          <a:prstGeom prst="rect">
+            <a:avLst/>
+          </a:prstGeom>
+          <a:noFill/>
+        </p:spPr>
+        <p:txBody>
+          <a:bodyPr wrap="square" rtlCol="0">
+            <a:spAutoFit/>
+          </a:bodyPr>
+          <a:lstStyle/>
+          <a:p>
+            <a:r>
+              <a:rPr lang="de-DE" sz="1200" dirty="0">
+                <a:solidFill>
+                  <a:schemeClr val="tx1">
+                    <a:lumMod val="85000"/>
+                    <a:lumOff val="15000"/>
+                  </a:schemeClr>
+                </a:solidFill>
+              </a:rPr>
+              <a:t>Wir nutzen Microsoft SQL Server sehr intensiv, nicht nur als Datenbank für die Ablage von Tabellen der Applikation. </a:t>
+            </a:r>
+          </a:p>
+          <a:p>
+            <a:r>
+              <a:rPr lang="de-DE" sz="1200" dirty="0">
+                <a:solidFill>
+                  <a:schemeClr val="tx1">
+                    <a:lumMod val="85000"/>
+                    <a:lumOff val="15000"/>
+                  </a:schemeClr>
+                </a:solidFill>
+              </a:rPr>
+              <a:t>Es ist für uns sehr hilfreich in Projekten ab der Größe „Mittel“ einen SQL Server mit vollen Rechten nutzen zu können, das kann realisiert werden indem wir:</a:t>
+            </a:r>
+          </a:p>
+          <a:p>
+            <a:pPr marL="800100" lvl="1" indent="-342900">
+              <a:buFont typeface="Arial" pitchFamily="34" charset="0"/>
+              <a:buChar char="•"/>
+            </a:pPr>
+            <a:r>
+              <a:rPr lang="de-DE" sz="1200" dirty="0">
+                <a:solidFill>
+                  <a:schemeClr val="tx1">
+                    <a:lumMod val="85000"/>
+                    <a:lumOff val="15000"/>
+                  </a:schemeClr>
+                </a:solidFill>
+              </a:rPr>
+              <a:t>Einen eigenen SQL Server in einer virtuellen Maschine nutzen</a:t>
+            </a:r>
+          </a:p>
+          <a:p>
+            <a:pPr marL="800100" lvl="1" indent="-342900">
+              <a:buFont typeface="Arial" pitchFamily="34" charset="0"/>
+              <a:buChar char="•"/>
+            </a:pPr>
+            <a:r>
+              <a:rPr lang="de-DE" sz="1200" dirty="0">
+                <a:solidFill>
+                  <a:schemeClr val="tx1">
+                    <a:lumMod val="85000"/>
+                    <a:lumOff val="15000"/>
+                  </a:schemeClr>
+                </a:solidFill>
+              </a:rPr>
+              <a:t>Eine eigene SQL Server Instanz auf einem zentralen Server nutzen</a:t>
+            </a:r>
+          </a:p>
+          <a:p>
+            <a:endParaRPr lang="de-DE" sz="1200" b="1" dirty="0">
+              <a:solidFill>
+                <a:schemeClr val="tx1">
+                  <a:lumMod val="85000"/>
+                  <a:lumOff val="15000"/>
+                </a:schemeClr>
+              </a:solidFill>
+            </a:endParaRPr>
+          </a:p>
+          <a:p>
+            <a:r>
+              <a:rPr lang="de-DE" sz="1200" dirty="0">
+                <a:solidFill>
+                  <a:schemeClr val="tx1">
+                    <a:lumMod val="85000"/>
+                    <a:lumOff val="15000"/>
+                  </a:schemeClr>
+                </a:solidFill>
+              </a:rPr>
+              <a:t>Sofern es nicht möglich ist uns einen SQL Server mit der Rolle </a:t>
+            </a:r>
+            <a:r>
+              <a:rPr lang="de-DE" sz="1200" dirty="0" err="1">
+                <a:solidFill>
+                  <a:schemeClr val="tx1">
+                    <a:lumMod val="85000"/>
+                    <a:lumOff val="15000"/>
+                  </a:schemeClr>
+                </a:solidFill>
+              </a:rPr>
+              <a:t>sysadmin</a:t>
+            </a:r>
+            <a:r>
+              <a:rPr lang="de-DE" sz="1200" dirty="0">
+                <a:solidFill>
+                  <a:schemeClr val="tx1">
+                    <a:lumMod val="85000"/>
+                    <a:lumOff val="15000"/>
+                  </a:schemeClr>
+                </a:solidFill>
+              </a:rPr>
+              <a:t> bereitzustellen, benötigen wir zumindest zeitweise administrativen Zugang für</a:t>
+            </a:r>
+          </a:p>
+          <a:p>
+            <a:pPr marL="800100" lvl="1" indent="-342900">
+              <a:buFont typeface="Arial" pitchFamily="34" charset="0"/>
+              <a:buChar char="•"/>
+            </a:pPr>
+            <a:r>
+              <a:rPr lang="de-DE" sz="1200" dirty="0">
+                <a:solidFill>
+                  <a:schemeClr val="tx1">
+                    <a:lumMod val="85000"/>
+                    <a:lumOff val="15000"/>
+                  </a:schemeClr>
+                </a:solidFill>
+              </a:rPr>
+              <a:t>Einrichtung von Jobs</a:t>
+            </a:r>
+            <a:endParaRPr lang="de-DE" sz="800" dirty="0">
+              <a:solidFill>
+                <a:schemeClr val="tx1">
+                  <a:lumMod val="85000"/>
+                  <a:lumOff val="15000"/>
+                </a:schemeClr>
+              </a:solidFill>
+            </a:endParaRPr>
+          </a:p>
+          <a:p>
+            <a:pPr marL="800100" lvl="1" indent="-342900">
+              <a:buFont typeface="Arial" pitchFamily="34" charset="0"/>
+              <a:buChar char="•"/>
+            </a:pPr>
+            <a:r>
+              <a:rPr lang="de-DE" sz="1200" dirty="0">
+                <a:solidFill>
+                  <a:schemeClr val="tx1">
+                    <a:lumMod val="85000"/>
+                    <a:lumOff val="15000"/>
+                  </a:schemeClr>
+                </a:solidFill>
+              </a:rPr>
+              <a:t>Einrichtung von </a:t>
+            </a:r>
+            <a:r>
+              <a:rPr lang="de-DE" sz="1200" dirty="0" err="1">
+                <a:solidFill>
+                  <a:schemeClr val="tx1">
+                    <a:lumMod val="85000"/>
+                    <a:lumOff val="15000"/>
+                  </a:schemeClr>
+                </a:solidFill>
+              </a:rPr>
+              <a:t>Linked</a:t>
+            </a:r>
+            <a:r>
+              <a:rPr lang="de-DE" sz="1200" dirty="0">
+                <a:solidFill>
+                  <a:schemeClr val="tx1">
+                    <a:lumMod val="85000"/>
+                    <a:lumOff val="15000"/>
+                  </a:schemeClr>
+                </a:solidFill>
+              </a:rPr>
+              <a:t> Server Verbindungen</a:t>
+            </a:r>
+            <a:endParaRPr lang="de-DE" sz="1000" dirty="0">
+              <a:solidFill>
+                <a:schemeClr val="tx1">
+                  <a:lumMod val="85000"/>
+                  <a:lumOff val="15000"/>
+                </a:schemeClr>
+              </a:solidFill>
+            </a:endParaRPr>
+          </a:p>
+          <a:p>
+            <a:pPr marL="800100" lvl="1" indent="-342900">
+              <a:buFont typeface="Arial" pitchFamily="34" charset="0"/>
+              <a:buChar char="•"/>
+            </a:pPr>
+            <a:r>
+              <a:rPr lang="de-DE" sz="1200" dirty="0">
+                <a:solidFill>
+                  <a:schemeClr val="tx1">
+                    <a:lumMod val="85000"/>
+                    <a:lumOff val="15000"/>
+                  </a:schemeClr>
+                </a:solidFill>
+              </a:rPr>
+              <a:t>Nutzung des Debuggers</a:t>
+            </a:r>
+          </a:p>
+          <a:p>
+            <a:pPr marL="800100" lvl="1" indent="-342900">
+              <a:buFont typeface="Arial" pitchFamily="34" charset="0"/>
+              <a:buChar char="•"/>
+            </a:pPr>
+            <a:r>
+              <a:rPr lang="de-DE" sz="1200" dirty="0">
+                <a:solidFill>
+                  <a:schemeClr val="tx1">
+                    <a:lumMod val="85000"/>
+                    <a:lumOff val="15000"/>
+                  </a:schemeClr>
+                </a:solidFill>
+              </a:rPr>
+              <a:t>Erstellung / Restore von Backups</a:t>
+            </a:r>
+            <a:endParaRPr lang="de-DE" sz="1000" dirty="0">
+              <a:solidFill>
+                <a:schemeClr val="tx1">
+                  <a:lumMod val="85000"/>
+                  <a:lumOff val="15000"/>
+                </a:schemeClr>
+              </a:solidFill>
+            </a:endParaRPr>
+          </a:p>
+          <a:p>
+            <a:pPr marL="342900" indent="-342900"/>
+            <a:endParaRPr lang="de-DE" sz="1200" b="1" dirty="0">
+              <a:solidFill>
+                <a:schemeClr val="tx1">
+                  <a:lumMod val="85000"/>
+                  <a:lumOff val="15000"/>
+                </a:schemeClr>
+              </a:solidFill>
+            </a:endParaRPr>
+          </a:p>
+          <a:p>
+            <a:pPr marL="342900" indent="-342900"/>
+            <a:endParaRPr lang="de-DE" sz="1200" b="1" dirty="0">
+              <a:solidFill>
+                <a:schemeClr val="tx1">
+                  <a:lumMod val="85000"/>
+                  <a:lumOff val="15000"/>
+                </a:schemeClr>
+              </a:solidFill>
+            </a:endParaRPr>
+          </a:p>
+          <a:p>
+            <a:pPr marL="342900" indent="-342900"/>
+            <a:r>
+              <a:rPr lang="de-DE" sz="1200" b="1" dirty="0">
+                <a:solidFill>
+                  <a:schemeClr val="tx1">
+                    <a:lumMod val="85000"/>
+                    <a:lumOff val="15000"/>
+                  </a:schemeClr>
+                </a:solidFill>
+              </a:rPr>
+              <a:t>	</a:t>
+            </a:r>
+          </a:p>
+        </p:txBody>
+      </p:sp>
+      <p:sp>
+        <p:nvSpPr>
+          <p:cNvPr id="10" name="Rechteck 9"/>
+          <p:cNvSpPr/>
+          <p:nvPr/>
+        </p:nvSpPr>
+        <p:spPr>
+          <a:xfrm>
+            <a:off x="0" y="755429"/>
+            <a:ext cx="6858000" cy="310245"/>
+          </a:xfrm>
+          <a:prstGeom prst="rect">
+            <a:avLst/>
+          </a:prstGeom>
+          <a:gradFill flip="none" rotWithShape="1">
+            <a:gsLst>
+              <a:gs pos="0">
+                <a:schemeClr val="tx1">
+                  <a:lumMod val="65000"/>
+                  <a:lumOff val="35000"/>
+                  <a:shade val="30000"/>
+                  <a:satMod val="115000"/>
+                </a:schemeClr>
+              </a:gs>
+              <a:gs pos="50000">
+                <a:schemeClr val="tx1">
+                  <a:lumMod val="65000"/>
+                  <a:lumOff val="35000"/>
+                  <a:shade val="67500"/>
+                  <a:satMod val="115000"/>
+                </a:schemeClr>
+              </a:gs>
+              <a:gs pos="100000">
+                <a:schemeClr val="tx1">
+                  <a:lumMod val="65000"/>
+                  <a:lumOff val="35000"/>
+                  <a:shade val="100000"/>
+                  <a:satMod val="115000"/>
+                </a:schemeClr>
+              </a:gs>
+            </a:gsLst>
+            <a:lin ang="10800000" scaled="1"/>
+            <a:tileRect/>
+          </a:gradFill>
+          <a:ln w="12700">
+            <a:noFill/>
+          </a:ln>
+          <a:effectLst>
+            <a:outerShdw blurRad="50800" dist="38100" dir="2700000" algn="tl" rotWithShape="0">
+              <a:prstClr val="black">
+                <a:alpha val="40000"/>
+              </a:prstClr>
+            </a:outerShdw>
+          </a:effectLst>
+        </p:spPr>
+        <p:style>
+          <a:lnRef idx="1">
+            <a:schemeClr val="dk1"/>
+          </a:lnRef>
+          <a:fillRef idx="2">
+            <a:schemeClr val="dk1"/>
+          </a:fillRef>
+          <a:effectRef idx="1">
+            <a:schemeClr val="dk1"/>
+          </a:effectRef>
+          <a:fontRef idx="minor">
+            <a:schemeClr val="dk1"/>
+          </a:fontRef>
+        </p:style>
+        <p:txBody>
+          <a:bodyPr/>
+          <a:lstStyle/>
+          <a:p>
+            <a:pPr algn="ctr"/>
+            <a:endParaRPr lang="de-DE" b="1" dirty="0">
+              <a:solidFill>
+                <a:schemeClr val="dk1"/>
+              </a:solidFill>
+            </a:endParaRPr>
+          </a:p>
+        </p:txBody>
+      </p:sp>
+      <p:sp>
+        <p:nvSpPr>
+          <p:cNvPr id="11" name="Textfeld 10"/>
+          <p:cNvSpPr txBox="1"/>
+          <p:nvPr/>
+        </p:nvSpPr>
+        <p:spPr>
+          <a:xfrm>
+            <a:off x="330645" y="749423"/>
+            <a:ext cx="1732847" cy="338554"/>
+          </a:xfrm>
+          <a:prstGeom prst="rect">
+            <a:avLst/>
+          </a:prstGeom>
+          <a:noFill/>
+        </p:spPr>
+        <p:txBody>
+          <a:bodyPr wrap="none" rtlCol="0">
+            <a:spAutoFit/>
+          </a:bodyPr>
+          <a:lstStyle/>
+          <a:p>
+            <a:r>
+              <a:rPr lang="de-DE" sz="1600" b="1" dirty="0">
+                <a:solidFill>
+                  <a:schemeClr val="bg1"/>
+                </a:solidFill>
+              </a:rPr>
+              <a:t>SQL Server Details</a:t>
+            </a:r>
+          </a:p>
+        </p:txBody>
+      </p:sp>
+      <p:sp>
+        <p:nvSpPr>
+          <p:cNvPr id="12" name="Rechteck 11"/>
+          <p:cNvSpPr/>
+          <p:nvPr/>
+        </p:nvSpPr>
+        <p:spPr>
+          <a:xfrm>
+            <a:off x="-1626" y="9417497"/>
+            <a:ext cx="6858000" cy="488504"/>
+          </a:xfrm>
+          <a:prstGeom prst="rect">
+            <a:avLst/>
+          </a:prstGeom>
+          <a:gradFill flip="none" rotWithShape="1">
+            <a:gsLst>
+              <a:gs pos="0">
+                <a:schemeClr val="tx1">
+                  <a:lumMod val="65000"/>
+                  <a:lumOff val="35000"/>
+                  <a:shade val="30000"/>
+                  <a:satMod val="115000"/>
+                </a:schemeClr>
+              </a:gs>
+              <a:gs pos="50000">
+                <a:schemeClr val="tx1">
+                  <a:lumMod val="65000"/>
+                  <a:lumOff val="35000"/>
+                  <a:shade val="67500"/>
+                  <a:satMod val="115000"/>
+                </a:schemeClr>
+              </a:gs>
+              <a:gs pos="100000">
+                <a:schemeClr val="tx1">
+                  <a:lumMod val="65000"/>
+                  <a:lumOff val="35000"/>
+                  <a:shade val="100000"/>
+                  <a:satMod val="115000"/>
+                </a:schemeClr>
+              </a:gs>
+            </a:gsLst>
+            <a:lin ang="10800000" scaled="1"/>
+            <a:tileRect/>
+          </a:gradFill>
+          <a:ln w="12700">
+            <a:noFill/>
+          </a:ln>
+          <a:effectLst>
+            <a:outerShdw blurRad="50800" dist="38100" dir="2700000" algn="tl" rotWithShape="0">
+              <a:prstClr val="black">
+                <a:alpha val="40000"/>
+              </a:prstClr>
+            </a:outerShdw>
+          </a:effectLst>
+        </p:spPr>
+        <p:style>
+          <a:lnRef idx="1">
+            <a:schemeClr val="dk1"/>
+          </a:lnRef>
+          <a:fillRef idx="2">
+            <a:schemeClr val="dk1"/>
+          </a:fillRef>
+          <a:effectRef idx="1">
+            <a:schemeClr val="dk1"/>
+          </a:effectRef>
+          <a:fontRef idx="minor">
+            <a:schemeClr val="dk1"/>
+          </a:fontRef>
+        </p:style>
+        <p:txBody>
+          <a:bodyPr/>
+          <a:lstStyle/>
+          <a:p>
+            <a:pPr algn="ctr"/>
+            <a:endParaRPr lang="de-DE" b="1" dirty="0">
+              <a:solidFill>
+                <a:schemeClr val="dk1"/>
+              </a:solidFill>
+            </a:endParaRPr>
+          </a:p>
+        </p:txBody>
+      </p:sp>
+      <p:sp>
+        <p:nvSpPr>
+          <p:cNvPr id="9" name="Textfeld 8"/>
+          <p:cNvSpPr txBox="1"/>
+          <p:nvPr/>
+        </p:nvSpPr>
+        <p:spPr>
+          <a:xfrm>
+            <a:off x="148890" y="9524470"/>
+            <a:ext cx="6216766" cy="400110"/>
+          </a:xfrm>
+          <a:prstGeom prst="rect">
+            <a:avLst/>
+          </a:prstGeom>
+          <a:noFill/>
+        </p:spPr>
+        <p:txBody>
+          <a:bodyPr wrap="none" rtlCol="0">
+            <a:spAutoFit/>
+          </a:bodyPr>
+          <a:lstStyle/>
+          <a:p>
+            <a:r>
+              <a:rPr lang="de-DE" sz="1000" b="1" dirty="0">
+                <a:solidFill>
+                  <a:schemeClr val="bg1"/>
+                </a:solidFill>
+              </a:rPr>
+              <a:t>Saxess Software GmbH</a:t>
+            </a:r>
+            <a:r>
+              <a:rPr lang="de-DE" sz="1000" dirty="0">
+                <a:solidFill>
+                  <a:schemeClr val="bg1"/>
+                </a:solidFill>
+              </a:rPr>
+              <a:t> | Springerstr.3 | 04105 Leipzig | Tel. +49 (341) 218299-50 | Mail info@saxess-software.de </a:t>
+            </a:r>
+          </a:p>
+          <a:p>
+            <a:endParaRPr lang="de-DE" sz="1000" dirty="0">
+              <a:solidFill>
+                <a:schemeClr val="bg1"/>
+              </a:solidFill>
+            </a:endParaRPr>
+          </a:p>
+        </p:txBody>
+      </p:sp>
+      <p:pic>
+        <p:nvPicPr>
+          <p:cNvPr id="13" name="Grafik 12"/>
+          <p:cNvPicPr>
+            <a:picLocks noChangeAspect="1"/>
+          </p:cNvPicPr>
+          <p:nvPr/>
+        </p:nvPicPr>
+        <p:blipFill>
+          <a:blip r:embed="rId2" cstate="print">
+            <a:extLst>
+              <a:ext uri="{28A0092B-C50C-407E-A947-70E740481C1C}">
+                <a14:useLocalDpi xmlns:a14="http://schemas.microsoft.com/office/drawing/2010/main" val="0"/>
+              </a:ext>
+            </a:extLst>
+          </a:blip>
+          <a:stretch>
+            <a:fillRect/>
+          </a:stretch>
+        </p:blipFill>
+        <p:spPr>
+          <a:xfrm>
+            <a:off x="5101654" y="131692"/>
+            <a:ext cx="1412776" cy="588178"/>
+          </a:xfrm>
+          <a:prstGeom prst="rect">
+            <a:avLst/>
+          </a:prstGeom>
+        </p:spPr>
+      </p:pic>
+    </p:spTree>
+    <p:extLst>
+      <p:ext uri="{BB962C8B-B14F-4D97-AF65-F5344CB8AC3E}">
+        <p14:creationId xmlns:p14="http://schemas.microsoft.com/office/powerpoint/2010/main" val="3313276137"/>
+      </p:ext>
+    </p:extLst>
+  </p:cSld>
+  <p:clrMapOvr>
+    <a:masterClrMapping/>
+  </p:clrMapOvr>
+</p:sld>
+</file>
+
+<file path=ppt/slides/slide4.xml><?xml version="1.0" encoding="utf-8"?>
 <p:sld xmlns:a="http://schemas.openxmlformats.org/drawingml/2006/main" xmlns:r="http://schemas.openxmlformats.org/officeDocument/2006/relationships" xmlns:p="http://schemas.openxmlformats.org/presentationml/2006/main">
   <p:cSld>
     <p:spTree>

</xml_diff>